<commit_message>
fixing raw correlation table
</commit_message>
<xml_diff>
--- a/data/outputs/figures/sample_sample_raw_correlation.pptx
+++ b/data/outputs/figures/sample_sample_raw_correlation.pptx
@@ -14987,7 +14987,7 @@
                           <a:ea typeface="DejaVu Sans"/>
                           <a:sym typeface="DejaVu Sans"/>
                         </a:rPr>
-                        <a:t>0.85</a:t>
+                        <a:t/>
                       </a:r>
                     </a:p>
                   </a:txBody>
@@ -15329,7 +15329,7 @@
                           <a:ea typeface="DejaVu Sans"/>
                           <a:sym typeface="DejaVu Sans"/>
                         </a:rPr>
-                        <a:t>0.87</a:t>
+                        <a:t/>
                       </a:r>
                     </a:p>
                   </a:txBody>
@@ -15397,7 +15397,7 @@
                           <a:ea typeface="DejaVu Sans"/>
                           <a:sym typeface="DejaVu Sans"/>
                         </a:rPr>
-                        <a:t>0.84</a:t>
+                        <a:t/>
                       </a:r>
                     </a:p>
                   </a:txBody>
@@ -15671,7 +15671,7 @@
                           <a:ea typeface="DejaVu Sans"/>
                           <a:sym typeface="DejaVu Sans"/>
                         </a:rPr>
-                        <a:t>0.86</a:t>
+                        <a:t/>
                       </a:r>
                     </a:p>
                   </a:txBody>
@@ -15739,7 +15739,7 @@
                           <a:ea typeface="DejaVu Sans"/>
                           <a:sym typeface="DejaVu Sans"/>
                         </a:rPr>
-                        <a:t>0.88</a:t>
+                        <a:t/>
                       </a:r>
                     </a:p>
                   </a:txBody>
@@ -15807,7 +15807,7 @@
                           <a:ea typeface="DejaVu Sans"/>
                           <a:sym typeface="DejaVu Sans"/>
                         </a:rPr>
-                        <a:t>0.87</a:t>
+                        <a:t/>
                       </a:r>
                     </a:p>
                   </a:txBody>

</xml_diff>